<commit_message>
updated XMAC -> XGMAC wrt TCPep;
</commit_message>
<xml_diff>
--- a/tg1pres/ns-naas-techgroup-cambs-14-v4.pptx
+++ b/tg1pres/ns-naas-techgroup-cambs-14-v4.pptx
@@ -26,7 +26,7 @@
     <p:sldId id="720" r:id="rId14"/>
     <p:sldId id="712" r:id="rId15"/>
     <p:sldId id="725" r:id="rId16"/>
-    <p:sldId id="726" r:id="rId17"/>
+    <p:sldId id="727" r:id="rId17"/>
     <p:sldId id="724" r:id="rId18"/>
     <p:sldId id="723" r:id="rId19"/>
     <p:sldId id="716" r:id="rId20"/>
@@ -12234,7 +12234,7 @@
         </p:blipFill>
         <p:spPr bwMode="auto">
           <a:xfrm>
-            <a:off x="316396" y="1249089"/>
+            <a:off x="266700" y="1239838"/>
             <a:ext cx="8458200" cy="5267325"/>
           </a:xfrm>
           <a:prstGeom prst="rect">
@@ -12278,7 +12278,7 @@
     </p:spTree>
     <p:extLst>
       <p:ext uri="{BB962C8B-B14F-4D97-AF65-F5344CB8AC3E}">
-        <p14:creationId xmlns:p14="http://schemas.microsoft.com/office/powerpoint/2010/main" val="3058005020"/>
+        <p14:creationId xmlns:p14="http://schemas.microsoft.com/office/powerpoint/2010/main" val="1295451561"/>
       </p:ext>
     </p:extLst>
   </p:cSld>

</xml_diff>